<commit_message>
cambiado titulo del proyecto a infoempleo scraping
</commit_message>
<xml_diff>
--- a/presentacion infoempleo.pptx
+++ b/presentacion infoempleo.pptx
@@ -20,11 +20,11 @@
   <p:notesSz cx="6858000" cy="9144000"/>
   <p:embeddedFontLst>
     <p:embeddedFont>
-      <p:font typeface="Sniglet" panose="020B0604020202020204" charset="0"/>
+      <p:font typeface="Walter Turncoat" panose="020B0604020202020204" charset="0"/>
       <p:regular r:id="rId10"/>
     </p:embeddedFont>
     <p:embeddedFont>
-      <p:font typeface="Walter Turncoat" panose="020B0604020202020204" charset="0"/>
+      <p:font typeface="Sniglet" panose="020B0604020202020204" charset="0"/>
       <p:regular r:id="rId11"/>
     </p:embeddedFont>
   </p:embeddedFontLst>
@@ -230,6 +230,11 @@
       </a:defRPr>
     </a:lvl9pPr>
   </p:defaultTextStyle>
+  <p:extLst>
+    <p:ext uri="{EFAFB233-063F-42B5-8137-9DF3F51BA10A}">
+      <p15:sldGuideLst xmlns:p15="http://schemas.microsoft.com/office/powerpoint/2012/main"/>
+    </p:ext>
+  </p:extLst>
 </p:presentation>
 </file>
 
@@ -4630,16 +4635,15 @@
               <a:buNone/>
             </a:pPr>
             <a:r>
-              <a:rPr lang="en" dirty="0"/>
-              <a:t>Scraping </a:t>
+              <a:rPr lang="es-ES" dirty="0"/>
+              <a:t>Infoempleo</a:t>
             </a:r>
+            <a:br>
+              <a:rPr lang="es-ES" dirty="0"/>
+            </a:br>
             <a:r>
               <a:rPr lang="es-ES" dirty="0"/>
-              <a:t>a</a:t>
-            </a:r>
-            <a:r>
-              <a:rPr lang="en" dirty="0"/>
-              <a:t> Infoempleo</a:t>
+              <a:t>Scraping</a:t>
             </a:r>
             <a:endParaRPr dirty="0"/>
           </a:p>
@@ -19541,15 +19545,7 @@
             </a:r>
             <a:r>
               <a:rPr lang="es-ES" dirty="0"/>
-              <a:t> Ángel: Encargado del </a:t>
-            </a:r>
-            <a:r>
-              <a:rPr lang="es-ES" dirty="0" err="1"/>
-              <a:t>Scraping</a:t>
-            </a:r>
-            <a:r>
-              <a:rPr lang="es-ES" dirty="0"/>
-              <a:t> en </a:t>
+              <a:t> Ángel: Encargado del Scraping en </a:t>
             </a:r>
             <a:r>
               <a:rPr lang="es-ES" dirty="0" err="1"/>

</xml_diff>